<commit_message>
mais cenas no powerpoint
</commit_message>
<xml_diff>
--- a/Projeto de MPEI – Sistema de deteção de.pptx
+++ b/Projeto de MPEI – Sistema de deteção de.pptx
@@ -7,10 +7,11 @@
   <p:sldIdLst>
     <p:sldId id="256" r:id="rId2"/>
     <p:sldId id="257" r:id="rId3"/>
-    <p:sldId id="261" r:id="rId4"/>
-    <p:sldId id="259" r:id="rId5"/>
-    <p:sldId id="258" r:id="rId6"/>
-    <p:sldId id="260" r:id="rId7"/>
+    <p:sldId id="259" r:id="rId4"/>
+    <p:sldId id="258" r:id="rId5"/>
+    <p:sldId id="260" r:id="rId6"/>
+    <p:sldId id="261" r:id="rId7"/>
+    <p:sldId id="262" r:id="rId8"/>
   </p:sldIdLst>
   <p:sldSz cx="12192000" cy="6858000"/>
   <p:notesSz cx="6858000" cy="9144000"/>
@@ -3572,6 +3573,376 @@
           <p:cNvPr id="2" name="Título 1">
             <a:extLst>
               <a:ext uri="{FF2B5EF4-FFF2-40B4-BE49-F238E27FC236}">
+                <a16:creationId xmlns:a16="http://schemas.microsoft.com/office/drawing/2014/main" id="{774D258B-B297-414F-930B-CE119D73A972}"/>
+              </a:ext>
+            </a:extLst>
+          </p:cNvPr>
+          <p:cNvSpPr>
+            <a:spLocks noGrp="1"/>
+          </p:cNvSpPr>
+          <p:nvPr>
+            <p:ph type="title"/>
+          </p:nvPr>
+        </p:nvSpPr>
+        <p:spPr/>
+        <p:txBody>
+          <a:bodyPr/>
+          <a:lstStyle/>
+          <a:p>
+            <a:pPr algn="ctr"/>
+            <a:r>
+              <a:rPr lang="pt-PT" dirty="0"/>
+              <a:t>Filtro de </a:t>
+            </a:r>
+            <a:r>
+              <a:rPr lang="pt-PT" dirty="0" err="1"/>
+              <a:t>Bloom</a:t>
+            </a:r>
+            <a:endParaRPr lang="pt-PT" dirty="0"/>
+          </a:p>
+        </p:txBody>
+      </p:sp>
+      <p:sp>
+        <p:nvSpPr>
+          <p:cNvPr id="3" name="Marcador de Posição de Conteúdo 2">
+            <a:extLst>
+              <a:ext uri="{FF2B5EF4-FFF2-40B4-BE49-F238E27FC236}">
+                <a16:creationId xmlns:a16="http://schemas.microsoft.com/office/drawing/2014/main" id="{CABA54E9-7F2E-4093-BBB1-144BD711B646}"/>
+              </a:ext>
+            </a:extLst>
+          </p:cNvPr>
+          <p:cNvSpPr>
+            <a:spLocks noGrp="1"/>
+          </p:cNvSpPr>
+          <p:nvPr>
+            <p:ph idx="1"/>
+          </p:nvPr>
+        </p:nvSpPr>
+        <p:spPr/>
+        <p:txBody>
+          <a:bodyPr/>
+          <a:lstStyle/>
+          <a:p>
+            <a:pPr marL="0" indent="0">
+              <a:buNone/>
+            </a:pPr>
+            <a:r>
+              <a:rPr lang="pt-PT" dirty="0"/>
+              <a:t>Um filtro de </a:t>
+            </a:r>
+            <a:r>
+              <a:rPr lang="pt-PT" dirty="0" err="1"/>
+              <a:t>bloom</a:t>
+            </a:r>
+            <a:r>
+              <a:rPr lang="pt-PT" dirty="0"/>
+              <a:t> será usado inicialmente para rapidamente </a:t>
+            </a:r>
+            <a:r>
+              <a:rPr lang="pt-PT" dirty="0" err="1"/>
+              <a:t>filtar</a:t>
+            </a:r>
+            <a:r>
+              <a:rPr lang="pt-PT" dirty="0"/>
+              <a:t> quais os sintomas conhecidos pelo </a:t>
+            </a:r>
+            <a:r>
+              <a:rPr lang="pt-PT" dirty="0" err="1"/>
+              <a:t>dataset</a:t>
+            </a:r>
+            <a:r>
+              <a:rPr lang="pt-PT" dirty="0"/>
+              <a:t> e quais serão descartados. </a:t>
+            </a:r>
+          </a:p>
+          <a:p>
+            <a:pPr marL="0" indent="0">
+              <a:buNone/>
+            </a:pPr>
+            <a:r>
+              <a:rPr lang="pt-PT" dirty="0"/>
+              <a:t>Se nenhum sintoma passar por esta fase, o programa será terminado.</a:t>
+            </a:r>
+          </a:p>
+        </p:txBody>
+      </p:sp>
+    </p:spTree>
+    <p:extLst>
+      <p:ext uri="{BB962C8B-B14F-4D97-AF65-F5344CB8AC3E}">
+        <p14:creationId xmlns:p14="http://schemas.microsoft.com/office/powerpoint/2010/main" val="2551874762"/>
+      </p:ext>
+    </p:extLst>
+  </p:cSld>
+  <p:clrMapOvr>
+    <a:masterClrMapping/>
+  </p:clrMapOvr>
+</p:sld>
+</file>
+
+<file path=ppt/slides/slide4.xml><?xml version="1.0" encoding="utf-8"?>
+<p:sld xmlns:a="http://schemas.openxmlformats.org/drawingml/2006/main" xmlns:r="http://schemas.openxmlformats.org/officeDocument/2006/relationships" xmlns:p="http://schemas.openxmlformats.org/presentationml/2006/main">
+  <p:cSld>
+    <p:spTree>
+      <p:nvGrpSpPr>
+        <p:cNvPr id="1" name=""/>
+        <p:cNvGrpSpPr/>
+        <p:nvPr/>
+      </p:nvGrpSpPr>
+      <p:grpSpPr>
+        <a:xfrm>
+          <a:off x="0" y="0"/>
+          <a:ext cx="0" cy="0"/>
+          <a:chOff x="0" y="0"/>
+          <a:chExt cx="0" cy="0"/>
+        </a:xfrm>
+      </p:grpSpPr>
+      <p:sp>
+        <p:nvSpPr>
+          <p:cNvPr id="2" name="Título 1">
+            <a:extLst>
+              <a:ext uri="{FF2B5EF4-FFF2-40B4-BE49-F238E27FC236}">
+                <a16:creationId xmlns:a16="http://schemas.microsoft.com/office/drawing/2014/main" id="{C207D198-8E94-492E-BA61-A529C3654501}"/>
+              </a:ext>
+            </a:extLst>
+          </p:cNvPr>
+          <p:cNvSpPr>
+            <a:spLocks noGrp="1"/>
+          </p:cNvSpPr>
+          <p:nvPr>
+            <p:ph type="title"/>
+          </p:nvPr>
+        </p:nvSpPr>
+        <p:spPr/>
+        <p:txBody>
+          <a:bodyPr/>
+          <a:lstStyle/>
+          <a:p>
+            <a:pPr algn="ctr"/>
+            <a:r>
+              <a:rPr lang="pt-PT" dirty="0"/>
+              <a:t>Classificador </a:t>
+            </a:r>
+            <a:r>
+              <a:rPr lang="pt-PT" dirty="0" err="1"/>
+              <a:t>Naive</a:t>
+            </a:r>
+            <a:r>
+              <a:rPr lang="pt-PT" dirty="0"/>
+              <a:t> </a:t>
+            </a:r>
+            <a:r>
+              <a:rPr lang="pt-PT" dirty="0" err="1"/>
+              <a:t>Bayes</a:t>
+            </a:r>
+            <a:endParaRPr lang="pt-PT" dirty="0"/>
+          </a:p>
+        </p:txBody>
+      </p:sp>
+      <p:sp>
+        <p:nvSpPr>
+          <p:cNvPr id="3" name="Marcador de Posição de Conteúdo 2">
+            <a:extLst>
+              <a:ext uri="{FF2B5EF4-FFF2-40B4-BE49-F238E27FC236}">
+                <a16:creationId xmlns:a16="http://schemas.microsoft.com/office/drawing/2014/main" id="{781B0B14-01CF-4B1D-B371-ABD763BFA074}"/>
+              </a:ext>
+            </a:extLst>
+          </p:cNvPr>
+          <p:cNvSpPr>
+            <a:spLocks noGrp="1"/>
+          </p:cNvSpPr>
+          <p:nvPr>
+            <p:ph idx="1"/>
+          </p:nvPr>
+        </p:nvSpPr>
+        <p:spPr/>
+        <p:txBody>
+          <a:bodyPr/>
+          <a:lstStyle/>
+          <a:p>
+            <a:pPr marL="0" indent="0">
+              <a:buNone/>
+            </a:pPr>
+            <a:r>
+              <a:rPr lang="pt-PT" dirty="0"/>
+              <a:t>O </a:t>
+            </a:r>
+            <a:r>
+              <a:rPr lang="pt-PT" dirty="0" err="1"/>
+              <a:t>classicador</a:t>
+            </a:r>
+            <a:r>
+              <a:rPr lang="pt-PT" dirty="0"/>
+              <a:t> </a:t>
+            </a:r>
+            <a:r>
+              <a:rPr lang="pt-PT" dirty="0" err="1"/>
+              <a:t>Naive</a:t>
+            </a:r>
+            <a:r>
+              <a:rPr lang="pt-PT" dirty="0"/>
+              <a:t> </a:t>
+            </a:r>
+            <a:r>
+              <a:rPr lang="pt-PT" dirty="0" err="1"/>
+              <a:t>Bayes</a:t>
+            </a:r>
+            <a:r>
+              <a:rPr lang="pt-PT" dirty="0"/>
+              <a:t> será utilizado para estimar a probabilidade de cada doença tendo em conta os sintomas conhecidos descritos. Através destes resultados, o programa irá listar a doença mais provável e a sua probabilidade.</a:t>
+            </a:r>
+          </a:p>
+        </p:txBody>
+      </p:sp>
+    </p:spTree>
+    <p:extLst>
+      <p:ext uri="{BB962C8B-B14F-4D97-AF65-F5344CB8AC3E}">
+        <p14:creationId xmlns:p14="http://schemas.microsoft.com/office/powerpoint/2010/main" val="1221254851"/>
+      </p:ext>
+    </p:extLst>
+  </p:cSld>
+  <p:clrMapOvr>
+    <a:masterClrMapping/>
+  </p:clrMapOvr>
+</p:sld>
+</file>
+
+<file path=ppt/slides/slide5.xml><?xml version="1.0" encoding="utf-8"?>
+<p:sld xmlns:a="http://schemas.openxmlformats.org/drawingml/2006/main" xmlns:r="http://schemas.openxmlformats.org/officeDocument/2006/relationships" xmlns:p="http://schemas.openxmlformats.org/presentationml/2006/main">
+  <p:cSld>
+    <p:spTree>
+      <p:nvGrpSpPr>
+        <p:cNvPr id="1" name=""/>
+        <p:cNvGrpSpPr/>
+        <p:nvPr/>
+      </p:nvGrpSpPr>
+      <p:grpSpPr>
+        <a:xfrm>
+          <a:off x="0" y="0"/>
+          <a:ext cx="0" cy="0"/>
+          <a:chOff x="0" y="0"/>
+          <a:chExt cx="0" cy="0"/>
+        </a:xfrm>
+      </p:grpSpPr>
+      <p:sp>
+        <p:nvSpPr>
+          <p:cNvPr id="2" name="Título 1">
+            <a:extLst>
+              <a:ext uri="{FF2B5EF4-FFF2-40B4-BE49-F238E27FC236}">
+                <a16:creationId xmlns:a16="http://schemas.microsoft.com/office/drawing/2014/main" id="{F60D4D63-8062-492C-B8BA-8812DADD0BFB}"/>
+              </a:ext>
+            </a:extLst>
+          </p:cNvPr>
+          <p:cNvSpPr>
+            <a:spLocks noGrp="1"/>
+          </p:cNvSpPr>
+          <p:nvPr>
+            <p:ph type="title"/>
+          </p:nvPr>
+        </p:nvSpPr>
+        <p:spPr/>
+        <p:txBody>
+          <a:bodyPr/>
+          <a:lstStyle/>
+          <a:p>
+            <a:pPr algn="ctr"/>
+            <a:r>
+              <a:rPr lang="pt-PT" dirty="0" err="1"/>
+              <a:t>Minhash</a:t>
+            </a:r>
+            <a:endParaRPr lang="pt-PT" dirty="0"/>
+          </a:p>
+        </p:txBody>
+      </p:sp>
+      <p:sp>
+        <p:nvSpPr>
+          <p:cNvPr id="3" name="Marcador de Posição de Conteúdo 2">
+            <a:extLst>
+              <a:ext uri="{FF2B5EF4-FFF2-40B4-BE49-F238E27FC236}">
+                <a16:creationId xmlns:a16="http://schemas.microsoft.com/office/drawing/2014/main" id="{6FE42D58-8531-4AC0-97A1-E2946B967B19}"/>
+              </a:ext>
+            </a:extLst>
+          </p:cNvPr>
+          <p:cNvSpPr>
+            <a:spLocks noGrp="1"/>
+          </p:cNvSpPr>
+          <p:nvPr>
+            <p:ph idx="1"/>
+          </p:nvPr>
+        </p:nvSpPr>
+        <p:spPr/>
+        <p:txBody>
+          <a:bodyPr/>
+          <a:lstStyle/>
+          <a:p>
+            <a:pPr marL="0" indent="0">
+              <a:buNone/>
+            </a:pPr>
+            <a:r>
+              <a:rPr lang="pt-PT" dirty="0"/>
+              <a:t>O </a:t>
+            </a:r>
+            <a:r>
+              <a:rPr lang="pt-PT" dirty="0" err="1"/>
+              <a:t>minhash</a:t>
+            </a:r>
+            <a:r>
+              <a:rPr lang="pt-PT" dirty="0"/>
+              <a:t> irá comparar a doença prevista pelo </a:t>
+            </a:r>
+            <a:r>
+              <a:rPr lang="pt-PT" dirty="0" err="1"/>
+              <a:t>naive</a:t>
+            </a:r>
+            <a:r>
+              <a:rPr lang="pt-PT" dirty="0"/>
+              <a:t> </a:t>
+            </a:r>
+            <a:r>
+              <a:rPr lang="pt-PT" dirty="0" err="1"/>
+              <a:t>bayes</a:t>
+            </a:r>
+            <a:r>
+              <a:rPr lang="pt-PT" dirty="0"/>
+              <a:t>, e listará as doenças parecidas com esta. Escrevendo o valor de similaridade</a:t>
+            </a:r>
+          </a:p>
+        </p:txBody>
+      </p:sp>
+    </p:spTree>
+    <p:extLst>
+      <p:ext uri="{BB962C8B-B14F-4D97-AF65-F5344CB8AC3E}">
+        <p14:creationId xmlns:p14="http://schemas.microsoft.com/office/powerpoint/2010/main" val="2638083194"/>
+      </p:ext>
+    </p:extLst>
+  </p:cSld>
+  <p:clrMapOvr>
+    <a:masterClrMapping/>
+  </p:clrMapOvr>
+</p:sld>
+</file>
+
+<file path=ppt/slides/slide6.xml><?xml version="1.0" encoding="utf-8"?>
+<p:sld xmlns:a="http://schemas.openxmlformats.org/drawingml/2006/main" xmlns:r="http://schemas.openxmlformats.org/officeDocument/2006/relationships" xmlns:p="http://schemas.openxmlformats.org/presentationml/2006/main">
+  <p:cSld>
+    <p:spTree>
+      <p:nvGrpSpPr>
+        <p:cNvPr id="1" name=""/>
+        <p:cNvGrpSpPr/>
+        <p:nvPr/>
+      </p:nvGrpSpPr>
+      <p:grpSpPr>
+        <a:xfrm>
+          <a:off x="0" y="0"/>
+          <a:ext cx="0" cy="0"/>
+          <a:chOff x="0" y="0"/>
+          <a:chExt cx="0" cy="0"/>
+        </a:xfrm>
+      </p:grpSpPr>
+      <p:sp>
+        <p:nvSpPr>
+          <p:cNvPr id="2" name="Título 1">
+            <a:extLst>
+              <a:ext uri="{FF2B5EF4-FFF2-40B4-BE49-F238E27FC236}">
                 <a16:creationId xmlns:a16="http://schemas.microsoft.com/office/drawing/2014/main" id="{8C9DD582-111C-4429-B11F-F840D78A77C3}"/>
               </a:ext>
             </a:extLst>
@@ -3813,7 +4184,7 @@
 </p:sld>
 </file>
 
-<file path=ppt/slides/slide4.xml><?xml version="1.0" encoding="utf-8"?>
+<file path=ppt/slides/slide7.xml><?xml version="1.0" encoding="utf-8"?>
 <p:sld xmlns:a="http://schemas.openxmlformats.org/drawingml/2006/main" xmlns:r="http://schemas.openxmlformats.org/officeDocument/2006/relationships" xmlns:p="http://schemas.openxmlformats.org/presentationml/2006/main">
   <p:cSld>
     <p:spTree>
@@ -3835,7 +4206,7 @@
           <p:cNvPr id="2" name="Título 1">
             <a:extLst>
               <a:ext uri="{FF2B5EF4-FFF2-40B4-BE49-F238E27FC236}">
-                <a16:creationId xmlns:a16="http://schemas.microsoft.com/office/drawing/2014/main" id="{774D258B-B297-414F-930B-CE119D73A972}"/>
+                <a16:creationId xmlns:a16="http://schemas.microsoft.com/office/drawing/2014/main" id="{58C9FA96-6B98-4E45-B3FE-168E51C89082}"/>
               </a:ext>
             </a:extLst>
           </p:cNvPr>
@@ -3854,13 +4225,8 @@
             <a:pPr algn="ctr"/>
             <a:r>
               <a:rPr lang="pt-PT" dirty="0"/>
-              <a:t>Filtro de </a:t>
-            </a:r>
-            <a:r>
-              <a:rPr lang="pt-PT" dirty="0" err="1"/>
-              <a:t>Bloom</a:t>
-            </a:r>
-            <a:endParaRPr lang="pt-PT" dirty="0"/>
+              <a:t>Exemplo de teste:</a:t>
+            </a:r>
           </a:p>
         </p:txBody>
       </p:sp>
@@ -3869,7 +4235,7 @@
           <p:cNvPr id="3" name="Marcador de Posição de Conteúdo 2">
             <a:extLst>
               <a:ext uri="{FF2B5EF4-FFF2-40B4-BE49-F238E27FC236}">
-                <a16:creationId xmlns:a16="http://schemas.microsoft.com/office/drawing/2014/main" id="{CABA54E9-7F2E-4093-BBB1-144BD711B646}"/>
+                <a16:creationId xmlns:a16="http://schemas.microsoft.com/office/drawing/2014/main" id="{33012ECF-CCEB-456C-9DAD-2941484D67B3}"/>
               </a:ext>
             </a:extLst>
           </p:cNvPr>
@@ -3882,31 +4248,14 @@
         </p:nvSpPr>
         <p:spPr/>
         <p:txBody>
-          <a:bodyPr/>
-          <a:lstStyle/>
-          <a:p>
-            <a:pPr marL="0" indent="0">
-              <a:buNone/>
-            </a:pPr>
+          <a:bodyPr>
+            <a:normAutofit fontScale="92500" lnSpcReduction="20000"/>
+          </a:bodyPr>
+          <a:lstStyle/>
+          <a:p>
             <a:r>
               <a:rPr lang="pt-PT" dirty="0"/>
-              <a:t>Um filtro de </a:t>
-            </a:r>
-            <a:r>
-              <a:rPr lang="pt-PT" dirty="0" err="1"/>
-              <a:t>bloom</a:t>
-            </a:r>
-            <a:r>
-              <a:rPr lang="pt-PT" dirty="0"/>
-              <a:t> será usado inicialmente para rapidamente </a:t>
-            </a:r>
-            <a:r>
-              <a:rPr lang="pt-PT" dirty="0" err="1"/>
-              <a:t>filtar</a:t>
-            </a:r>
-            <a:r>
-              <a:rPr lang="pt-PT" dirty="0"/>
-              <a:t> quais os sintomas conhecidos pelo </a:t>
+              <a:t>Dataset.csv (recomendamos meter como “false” o segundo argumento ao usar este </a:t>
             </a:r>
             <a:r>
               <a:rPr lang="pt-PT" dirty="0" err="1"/>
@@ -3914,266 +4263,158 @@
             </a:r>
             <a:r>
               <a:rPr lang="pt-PT" dirty="0"/>
-              <a:t> e quais serão descartados. </a:t>
+              <a:t>)</a:t>
+            </a:r>
+          </a:p>
+          <a:p>
+            <a:r>
+              <a:rPr lang="pt-PT" dirty="0"/>
+              <a:t>Inputs – “Tosse”, “Febre”</a:t>
+            </a:r>
+          </a:p>
+          <a:p>
+            <a:r>
+              <a:rPr lang="pt-PT" dirty="0"/>
+              <a:t>Output - </a:t>
+            </a:r>
+            <a:r>
+              <a:rPr lang="pt-PT" b="0" i="0" dirty="0">
+                <a:effectLst/>
+                <a:latin typeface="gg sans"/>
+              </a:rPr>
+              <a:t>{'Alergia' } {[</a:t>
+            </a:r>
+            <a:r>
+              <a:rPr lang="pt-PT" b="0" i="0" dirty="0">
+                <a:solidFill>
+                  <a:schemeClr val="accent2"/>
+                </a:solidFill>
+                <a:effectLst/>
+                <a:latin typeface="gg sans"/>
+              </a:rPr>
+              <a:t>0.0789</a:t>
+            </a:r>
+            <a:r>
+              <a:rPr lang="pt-PT" b="0" i="0" dirty="0">
+                <a:effectLst/>
+                <a:latin typeface="gg sans"/>
+              </a:rPr>
+              <a:t>]} {'Anemia' } {[0.0074]} {'Artrite' } {[0.0080]} {'Asma' } {[</a:t>
+            </a:r>
+            <a:r>
+              <a:rPr lang="pt-PT" b="0" i="0" dirty="0">
+                <a:solidFill>
+                  <a:srgbClr val="FF0000"/>
+                </a:solidFill>
+                <a:effectLst/>
+                <a:latin typeface="gg sans"/>
+              </a:rPr>
+              <a:t>0.1095</a:t>
+            </a:r>
+            <a:r>
+              <a:rPr lang="pt-PT" b="0" i="0" dirty="0">
+                <a:effectLst/>
+                <a:latin typeface="gg sans"/>
+              </a:rPr>
+              <a:t>]} {'Bronquite' } {[0.0072]} {'COVID-19' } {[</a:t>
+            </a:r>
+            <a:r>
+              <a:rPr lang="pt-PT" b="0" i="0" dirty="0">
+                <a:solidFill>
+                  <a:schemeClr val="accent2"/>
+                </a:solidFill>
+                <a:effectLst/>
+                <a:latin typeface="gg sans"/>
+              </a:rPr>
+              <a:t>0.0596</a:t>
+            </a:r>
+            <a:r>
+              <a:rPr lang="pt-PT" b="0" i="0" dirty="0">
+                <a:effectLst/>
+                <a:latin typeface="gg sans"/>
+              </a:rPr>
+              <a:t>]} {'Câncer' } {[0.0076]} {'Depressão' } {[0.0059]} {'Dermatite' } {[0.0067]} {'Diabetes' } {[0.0070]} {'Enxaqueca' } {[0.0076]} {'Gripe' } {[</a:t>
+            </a:r>
+            <a:r>
+              <a:rPr lang="pt-PT" b="0" i="0" dirty="0">
+                <a:solidFill>
+                  <a:srgbClr val="FF0000"/>
+                </a:solidFill>
+                <a:effectLst/>
+                <a:latin typeface="gg sans"/>
+              </a:rPr>
+              <a:t>0.6097</a:t>
+            </a:r>
+            <a:r>
+              <a:rPr lang="pt-PT" b="0" i="0" dirty="0">
+                <a:effectLst/>
+                <a:latin typeface="gg sans"/>
+              </a:rPr>
+              <a:t>]} {'Hipertensão' } {[0.0055]} {'</a:t>
+            </a:r>
+            <a:r>
+              <a:rPr lang="pt-PT" b="0" i="0" dirty="0" err="1">
+                <a:effectLst/>
+                <a:latin typeface="gg sans"/>
+              </a:rPr>
+              <a:t>Infecção</a:t>
+            </a:r>
+            <a:r>
+              <a:rPr lang="pt-PT" b="0" i="0" dirty="0">
+                <a:effectLst/>
+                <a:latin typeface="gg sans"/>
+              </a:rPr>
+              <a:t> urinária'} {[0.0696]} {'Insônia' } {[0.0098]}</a:t>
             </a:r>
           </a:p>
           <a:p>
             <a:pPr marL="0" indent="0">
               <a:buNone/>
             </a:pPr>
-            <a:r>
-              <a:rPr lang="pt-PT" dirty="0"/>
-              <a:t>Se nenhum sintoma passar por esta fase, o programa será terminado.</a:t>
-            </a:r>
+            <a:endParaRPr lang="pt-PT" dirty="0">
+              <a:latin typeface="gg sans"/>
+            </a:endParaRPr>
+          </a:p>
+          <a:p>
+            <a:pPr marL="0" indent="0">
+              <a:buNone/>
+            </a:pPr>
+            <a:r>
+              <a:rPr lang="pt-PT" b="0" i="0" dirty="0">
+                <a:effectLst/>
+                <a:latin typeface="gg sans"/>
+              </a:rPr>
+              <a:t>Numa fase mais avançada, a função </a:t>
+            </a:r>
+            <a:r>
+              <a:rPr lang="pt-PT" b="0" i="0" dirty="0" err="1">
+                <a:effectLst/>
+                <a:latin typeface="gg sans"/>
+              </a:rPr>
+              <a:t>main</a:t>
+            </a:r>
+            <a:r>
+              <a:rPr lang="pt-PT" b="0" i="0" dirty="0">
+                <a:effectLst/>
+                <a:latin typeface="gg sans"/>
+              </a:rPr>
+              <a:t> apenas apresentará o nome das doenças mais prováveis.</a:t>
+            </a:r>
+          </a:p>
+          <a:p>
+            <a:pPr marL="0" indent="0">
+              <a:buNone/>
+            </a:pPr>
+            <a:endParaRPr lang="pt-PT" dirty="0">
+              <a:latin typeface="gg sans"/>
+            </a:endParaRPr>
           </a:p>
         </p:txBody>
       </p:sp>
     </p:spTree>
     <p:extLst>
       <p:ext uri="{BB962C8B-B14F-4D97-AF65-F5344CB8AC3E}">
-        <p14:creationId xmlns:p14="http://schemas.microsoft.com/office/powerpoint/2010/main" val="2551874762"/>
-      </p:ext>
-    </p:extLst>
-  </p:cSld>
-  <p:clrMapOvr>
-    <a:masterClrMapping/>
-  </p:clrMapOvr>
-</p:sld>
-</file>
-
-<file path=ppt/slides/slide5.xml><?xml version="1.0" encoding="utf-8"?>
-<p:sld xmlns:a="http://schemas.openxmlformats.org/drawingml/2006/main" xmlns:r="http://schemas.openxmlformats.org/officeDocument/2006/relationships" xmlns:p="http://schemas.openxmlformats.org/presentationml/2006/main">
-  <p:cSld>
-    <p:spTree>
-      <p:nvGrpSpPr>
-        <p:cNvPr id="1" name=""/>
-        <p:cNvGrpSpPr/>
-        <p:nvPr/>
-      </p:nvGrpSpPr>
-      <p:grpSpPr>
-        <a:xfrm>
-          <a:off x="0" y="0"/>
-          <a:ext cx="0" cy="0"/>
-          <a:chOff x="0" y="0"/>
-          <a:chExt cx="0" cy="0"/>
-        </a:xfrm>
-      </p:grpSpPr>
-      <p:sp>
-        <p:nvSpPr>
-          <p:cNvPr id="2" name="Título 1">
-            <a:extLst>
-              <a:ext uri="{FF2B5EF4-FFF2-40B4-BE49-F238E27FC236}">
-                <a16:creationId xmlns:a16="http://schemas.microsoft.com/office/drawing/2014/main" id="{C207D198-8E94-492E-BA61-A529C3654501}"/>
-              </a:ext>
-            </a:extLst>
-          </p:cNvPr>
-          <p:cNvSpPr>
-            <a:spLocks noGrp="1"/>
-          </p:cNvSpPr>
-          <p:nvPr>
-            <p:ph type="title"/>
-          </p:nvPr>
-        </p:nvSpPr>
-        <p:spPr/>
-        <p:txBody>
-          <a:bodyPr/>
-          <a:lstStyle/>
-          <a:p>
-            <a:pPr algn="ctr"/>
-            <a:r>
-              <a:rPr lang="pt-PT" dirty="0"/>
-              <a:t>Classificador </a:t>
-            </a:r>
-            <a:r>
-              <a:rPr lang="pt-PT" dirty="0" err="1"/>
-              <a:t>Naive</a:t>
-            </a:r>
-            <a:r>
-              <a:rPr lang="pt-PT" dirty="0"/>
-              <a:t> </a:t>
-            </a:r>
-            <a:r>
-              <a:rPr lang="pt-PT" dirty="0" err="1"/>
-              <a:t>Bayes</a:t>
-            </a:r>
-            <a:endParaRPr lang="pt-PT" dirty="0"/>
-          </a:p>
-        </p:txBody>
-      </p:sp>
-      <p:sp>
-        <p:nvSpPr>
-          <p:cNvPr id="3" name="Marcador de Posição de Conteúdo 2">
-            <a:extLst>
-              <a:ext uri="{FF2B5EF4-FFF2-40B4-BE49-F238E27FC236}">
-                <a16:creationId xmlns:a16="http://schemas.microsoft.com/office/drawing/2014/main" id="{781B0B14-01CF-4B1D-B371-ABD763BFA074}"/>
-              </a:ext>
-            </a:extLst>
-          </p:cNvPr>
-          <p:cNvSpPr>
-            <a:spLocks noGrp="1"/>
-          </p:cNvSpPr>
-          <p:nvPr>
-            <p:ph idx="1"/>
-          </p:nvPr>
-        </p:nvSpPr>
-        <p:spPr/>
-        <p:txBody>
-          <a:bodyPr/>
-          <a:lstStyle/>
-          <a:p>
-            <a:pPr marL="0" indent="0">
-              <a:buNone/>
-            </a:pPr>
-            <a:r>
-              <a:rPr lang="pt-PT" dirty="0"/>
-              <a:t>O </a:t>
-            </a:r>
-            <a:r>
-              <a:rPr lang="pt-PT" dirty="0" err="1"/>
-              <a:t>classicador</a:t>
-            </a:r>
-            <a:r>
-              <a:rPr lang="pt-PT" dirty="0"/>
-              <a:t> </a:t>
-            </a:r>
-            <a:r>
-              <a:rPr lang="pt-PT" dirty="0" err="1"/>
-              <a:t>Naive</a:t>
-            </a:r>
-            <a:r>
-              <a:rPr lang="pt-PT" dirty="0"/>
-              <a:t> </a:t>
-            </a:r>
-            <a:r>
-              <a:rPr lang="pt-PT" dirty="0" err="1"/>
-              <a:t>Bayes</a:t>
-            </a:r>
-            <a:r>
-              <a:rPr lang="pt-PT" dirty="0"/>
-              <a:t> será utilizado para estimar a probabilidade de cada doença tendo em conta os sintomas conhecidos descritos. Através destes resultados, o programa irá listar a doença mais provável e a sua probabilidade.</a:t>
-            </a:r>
-          </a:p>
-        </p:txBody>
-      </p:sp>
-    </p:spTree>
-    <p:extLst>
-      <p:ext uri="{BB962C8B-B14F-4D97-AF65-F5344CB8AC3E}">
-        <p14:creationId xmlns:p14="http://schemas.microsoft.com/office/powerpoint/2010/main" val="1221254851"/>
-      </p:ext>
-    </p:extLst>
-  </p:cSld>
-  <p:clrMapOvr>
-    <a:masterClrMapping/>
-  </p:clrMapOvr>
-</p:sld>
-</file>
-
-<file path=ppt/slides/slide6.xml><?xml version="1.0" encoding="utf-8"?>
-<p:sld xmlns:a="http://schemas.openxmlformats.org/drawingml/2006/main" xmlns:r="http://schemas.openxmlformats.org/officeDocument/2006/relationships" xmlns:p="http://schemas.openxmlformats.org/presentationml/2006/main">
-  <p:cSld>
-    <p:spTree>
-      <p:nvGrpSpPr>
-        <p:cNvPr id="1" name=""/>
-        <p:cNvGrpSpPr/>
-        <p:nvPr/>
-      </p:nvGrpSpPr>
-      <p:grpSpPr>
-        <a:xfrm>
-          <a:off x="0" y="0"/>
-          <a:ext cx="0" cy="0"/>
-          <a:chOff x="0" y="0"/>
-          <a:chExt cx="0" cy="0"/>
-        </a:xfrm>
-      </p:grpSpPr>
-      <p:sp>
-        <p:nvSpPr>
-          <p:cNvPr id="2" name="Título 1">
-            <a:extLst>
-              <a:ext uri="{FF2B5EF4-FFF2-40B4-BE49-F238E27FC236}">
-                <a16:creationId xmlns:a16="http://schemas.microsoft.com/office/drawing/2014/main" id="{F60D4D63-8062-492C-B8BA-8812DADD0BFB}"/>
-              </a:ext>
-            </a:extLst>
-          </p:cNvPr>
-          <p:cNvSpPr>
-            <a:spLocks noGrp="1"/>
-          </p:cNvSpPr>
-          <p:nvPr>
-            <p:ph type="title"/>
-          </p:nvPr>
-        </p:nvSpPr>
-        <p:spPr/>
-        <p:txBody>
-          <a:bodyPr/>
-          <a:lstStyle/>
-          <a:p>
-            <a:pPr algn="ctr"/>
-            <a:r>
-              <a:rPr lang="pt-PT" dirty="0" err="1"/>
-              <a:t>Minhash</a:t>
-            </a:r>
-            <a:endParaRPr lang="pt-PT" dirty="0"/>
-          </a:p>
-        </p:txBody>
-      </p:sp>
-      <p:sp>
-        <p:nvSpPr>
-          <p:cNvPr id="3" name="Marcador de Posição de Conteúdo 2">
-            <a:extLst>
-              <a:ext uri="{FF2B5EF4-FFF2-40B4-BE49-F238E27FC236}">
-                <a16:creationId xmlns:a16="http://schemas.microsoft.com/office/drawing/2014/main" id="{6FE42D58-8531-4AC0-97A1-E2946B967B19}"/>
-              </a:ext>
-            </a:extLst>
-          </p:cNvPr>
-          <p:cNvSpPr>
-            <a:spLocks noGrp="1"/>
-          </p:cNvSpPr>
-          <p:nvPr>
-            <p:ph idx="1"/>
-          </p:nvPr>
-        </p:nvSpPr>
-        <p:spPr/>
-        <p:txBody>
-          <a:bodyPr/>
-          <a:lstStyle/>
-          <a:p>
-            <a:pPr marL="0" indent="0">
-              <a:buNone/>
-            </a:pPr>
-            <a:r>
-              <a:rPr lang="pt-PT" dirty="0"/>
-              <a:t>O </a:t>
-            </a:r>
-            <a:r>
-              <a:rPr lang="pt-PT" dirty="0" err="1"/>
-              <a:t>minhash</a:t>
-            </a:r>
-            <a:r>
-              <a:rPr lang="pt-PT" dirty="0"/>
-              <a:t> irá comparar a doença prevista pelo </a:t>
-            </a:r>
-            <a:r>
-              <a:rPr lang="pt-PT" dirty="0" err="1"/>
-              <a:t>naive</a:t>
-            </a:r>
-            <a:r>
-              <a:rPr lang="pt-PT" dirty="0"/>
-              <a:t> </a:t>
-            </a:r>
-            <a:r>
-              <a:rPr lang="pt-PT" dirty="0" err="1"/>
-              <a:t>bayes</a:t>
-            </a:r>
-            <a:r>
-              <a:rPr lang="pt-PT" dirty="0"/>
-              <a:t>, e listará as doenças parecidas com esta. Escrevendo o valor de similaridade</a:t>
-            </a:r>
-          </a:p>
-        </p:txBody>
-      </p:sp>
-    </p:spTree>
-    <p:extLst>
-      <p:ext uri="{BB962C8B-B14F-4D97-AF65-F5344CB8AC3E}">
-        <p14:creationId xmlns:p14="http://schemas.microsoft.com/office/powerpoint/2010/main" val="2638083194"/>
+        <p14:creationId xmlns:p14="http://schemas.microsoft.com/office/powerpoint/2010/main" val="629974318"/>
       </p:ext>
     </p:extLst>
   </p:cSld>

</xml_diff>